<commit_message>
Update Resarch Des and Prop Wrt TU060_2 DS Ciaran Finnegan d21124026 cf v1-2 161022.pptx
</commit_message>
<xml_diff>
--- a/Resarch Des and Prop Wrt TU060_2 DS Ciaran Finnegan d21124026 cf v1-2 161022.pptx
+++ b/Resarch Des and Prop Wrt TU060_2 DS Ciaran Finnegan d21124026 cf v1-2 161022.pptx
@@ -215,7 +215,7 @@
           <a:p>
             <a:fld id="{7451CB58-2469-45B2-A714-895C122137A0}" type="datetimeFigureOut">
               <a:rPr lang="en-IE" smtClean="0"/>
-              <a:t>21/10/2022</a:t>
+              <a:t>22/10/2022</a:t>
             </a:fld>
             <a:endParaRPr lang="en-IE"/>
           </a:p>
@@ -1828,7 +1828,7 @@
           <a:p>
             <a:fld id="{9184DA70-C731-4C70-880D-CCD4705E623C}" type="datetime1">
               <a:rPr lang="en-US" smtClean="0"/>
-              <a:t>10/21/2022</a:t>
+              <a:t>10/22/2022</a:t>
             </a:fld>
             <a:endParaRPr lang="en-US" dirty="0"/>
           </a:p>
@@ -2016,7 +2016,7 @@
           <a:p>
             <a:fld id="{4BE1D723-8F53-4F53-90B0-1982A396982E}" type="datetime1">
               <a:rPr lang="en-US" smtClean="0"/>
-              <a:t>10/21/2022</a:t>
+              <a:t>10/22/2022</a:t>
             </a:fld>
             <a:endParaRPr lang="en-US" dirty="0"/>
           </a:p>
@@ -2389,7 +2389,7 @@
           <a:p>
             <a:fld id="{97669AF7-7BEB-44E4-9852-375E34362B5B}" type="datetime1">
               <a:rPr lang="en-US" smtClean="0"/>
-              <a:t>10/21/2022</a:t>
+              <a:t>10/22/2022</a:t>
             </a:fld>
             <a:endParaRPr lang="en-US" dirty="0"/>
           </a:p>
@@ -2644,7 +2644,7 @@
           <a:p>
             <a:fld id="{BAAAC38D-0552-4C82-B593-E6124DFADBE2}" type="datetime1">
               <a:rPr lang="en-US" smtClean="0"/>
-              <a:t>10/21/2022</a:t>
+              <a:t>10/22/2022</a:t>
             </a:fld>
             <a:endParaRPr lang="en-US" dirty="0"/>
           </a:p>
@@ -3041,7 +3041,7 @@
           <a:p>
             <a:fld id="{D9DF0F1C-5577-4ACB-BB62-DF8F3C494C7E}" type="datetime1">
               <a:rPr lang="en-US" smtClean="0"/>
-              <a:t>10/21/2022</a:t>
+              <a:t>10/22/2022</a:t>
             </a:fld>
             <a:endParaRPr lang="en-US" dirty="0"/>
           </a:p>
@@ -3177,7 +3177,7 @@
           <a:p>
             <a:fld id="{1775B394-D9F9-4F0C-B15D-605F45CB9E9F}" type="datetime1">
               <a:rPr lang="en-US" smtClean="0"/>
-              <a:t>10/21/2022</a:t>
+              <a:t>10/22/2022</a:t>
             </a:fld>
             <a:endParaRPr lang="en-US" dirty="0"/>
           </a:p>
@@ -3334,7 +3334,7 @@
           <a:p>
             <a:fld id="{39667345-2558-425A-8533-9BFDBCE15005}" type="datetime1">
               <a:rPr lang="en-US" smtClean="0"/>
-              <a:t>10/21/2022</a:t>
+              <a:t>10/22/2022</a:t>
             </a:fld>
             <a:endParaRPr lang="en-US" dirty="0"/>
           </a:p>
@@ -3663,7 +3663,7 @@
           <a:p>
             <a:fld id="{92BEA474-078D-4E9B-9B14-09A87B19DC46}" type="datetime1">
               <a:rPr lang="en-US" smtClean="0"/>
-              <a:t>10/21/2022</a:t>
+              <a:t>10/22/2022</a:t>
             </a:fld>
             <a:endParaRPr lang="en-US" dirty="0"/>
           </a:p>
@@ -4013,7 +4013,7 @@
           <a:p>
             <a:fld id="{4907D986-8816-4272-A432-0437A28A9828}" type="datetime1">
               <a:rPr lang="en-US" smtClean="0"/>
-              <a:t>10/21/2022</a:t>
+              <a:t>10/22/2022</a:t>
             </a:fld>
             <a:endParaRPr lang="en-US" dirty="0"/>
           </a:p>
@@ -4274,7 +4274,7 @@
           <a:p>
             <a:fld id="{62D6E202-B606-4609-B914-27C9371A1F6D}" type="datetime1">
               <a:rPr lang="en-US" smtClean="0"/>
-              <a:t>10/21/2022</a:t>
+              <a:t>10/22/2022</a:t>
             </a:fld>
             <a:endParaRPr lang="en-US" dirty="0"/>
           </a:p>
@@ -7078,20 +7078,13 @@
             <p:ph type="title"/>
           </p:nvPr>
         </p:nvSpPr>
-        <p:spPr>
-          <a:xfrm>
-            <a:off x="1097280" y="260478"/>
-            <a:ext cx="10789920" cy="1450757"/>
-          </a:xfrm>
-        </p:spPr>
+        <p:spPr/>
         <p:txBody>
-          <a:bodyPr>
-            <a:normAutofit/>
-          </a:bodyPr>
+          <a:bodyPr/>
           <a:lstStyle/>
           <a:p>
             <a:r>
-              <a:rPr lang="en-GB" sz="4000" dirty="0"/>
+              <a:rPr lang="en-GB" dirty="0"/>
               <a:t>Feasibility of the Study</a:t>
             </a:r>
           </a:p>
@@ -7113,85 +7106,54 @@
             <p:ph idx="1"/>
           </p:nvPr>
         </p:nvSpPr>
-        <p:spPr>
-          <a:xfrm>
-            <a:off x="1097280" y="1920239"/>
-            <a:ext cx="10058400" cy="4310744"/>
-          </a:xfrm>
-        </p:spPr>
+        <p:spPr/>
         <p:txBody>
-          <a:bodyPr>
-            <a:normAutofit/>
-          </a:bodyPr>
+          <a:bodyPr/>
           <a:lstStyle/>
           <a:p>
             <a:r>
-              <a:rPr lang="en-GB" sz="2000" b="1" dirty="0"/>
+              <a:rPr lang="en-GB" dirty="0"/>
               <a:t>Planned Tasks and Timelines</a:t>
             </a:r>
           </a:p>
           <a:p>
-            <a:pPr>
-              <a:buFont typeface="Arial" panose="020B0604020202020204" pitchFamily="34" charset="0"/>
-              <a:buChar char="•"/>
-            </a:pPr>
-            <a:r>
-              <a:rPr lang="en-GB" sz="2000" dirty="0"/>
+            <a:r>
+              <a:rPr lang="en-GB" dirty="0"/>
               <a:t>Task 1 – and timeline</a:t>
             </a:r>
           </a:p>
           <a:p>
-            <a:pPr>
-              <a:buFont typeface="Arial" panose="020B0604020202020204" pitchFamily="34" charset="0"/>
-              <a:buChar char="•"/>
-            </a:pPr>
-            <a:r>
-              <a:rPr lang="en-GB" sz="2000" dirty="0"/>
+            <a:r>
+              <a:rPr lang="en-GB" dirty="0"/>
               <a:t>Task 2 – and timeline</a:t>
             </a:r>
           </a:p>
           <a:p>
-            <a:pPr>
-              <a:buFont typeface="Arial" panose="020B0604020202020204" pitchFamily="34" charset="0"/>
-              <a:buChar char="•"/>
-            </a:pPr>
-            <a:r>
-              <a:rPr lang="en-GB" sz="2000" dirty="0"/>
+            <a:r>
+              <a:rPr lang="en-GB" dirty="0"/>
               <a:t>Task 3 – and timeline</a:t>
             </a:r>
           </a:p>
           <a:p>
-            <a:pPr>
-              <a:buFont typeface="Arial" panose="020B0604020202020204" pitchFamily="34" charset="0"/>
-              <a:buChar char="•"/>
-            </a:pPr>
-            <a:r>
-              <a:rPr lang="en-GB" sz="2000" dirty="0"/>
+            <a:r>
+              <a:rPr lang="en-GB" dirty="0"/>
               <a:t>Task 4 – and timeline</a:t>
             </a:r>
           </a:p>
           <a:p>
-            <a:pPr>
-              <a:buFont typeface="Arial" panose="020B0604020202020204" pitchFamily="34" charset="0"/>
-              <a:buChar char="•"/>
-            </a:pPr>
-            <a:r>
-              <a:rPr lang="en-GB" sz="2000" dirty="0"/>
+            <a:r>
+              <a:rPr lang="en-GB" dirty="0"/>
               <a:t>Task 5 – and timeline</a:t>
             </a:r>
           </a:p>
           <a:p>
-            <a:pPr>
-              <a:buFont typeface="Arial" panose="020B0604020202020204" pitchFamily="34" charset="0"/>
-              <a:buChar char="•"/>
-            </a:pPr>
-            <a:endParaRPr lang="en-GB" sz="2000" dirty="0"/>
-          </a:p>
-          <a:p>
-            <a:endParaRPr lang="en-GB" sz="2000" dirty="0"/>
-          </a:p>
-          <a:p>
-            <a:endParaRPr lang="en-IE" sz="2000" dirty="0"/>
+            <a:endParaRPr lang="en-GB" dirty="0"/>
+          </a:p>
+          <a:p>
+            <a:endParaRPr lang="en-GB" dirty="0"/>
+          </a:p>
+          <a:p>
+            <a:endParaRPr lang="en-IE" dirty="0"/>
           </a:p>
         </p:txBody>
       </p:sp>
@@ -9864,15 +9826,6 @@
 </file>
 
 <file path=customXml/item1.xml><?xml version="1.0" encoding="utf-8"?>
-<p:properties xmlns:p="http://schemas.microsoft.com/office/2006/metadata/properties" xmlns:xsi="http://www.w3.org/2001/XMLSchema-instance" xmlns:pc="http://schemas.microsoft.com/office/infopath/2007/PartnerControls">
-  <documentManagement>
-    <Status xmlns="71af3243-3dd4-4a8d-8c0d-dd76da1f02a5">Not started</Status>
-    <MediaServiceKeyPoints xmlns="71af3243-3dd4-4a8d-8c0d-dd76da1f02a5" xsi:nil="true"/>
-  </documentManagement>
-</p:properties>
-</file>
-
-<file path=customXml/item2.xml><?xml version="1.0" encoding="utf-8"?>
 <ct:contentTypeSchema xmlns:ct="http://schemas.microsoft.com/office/2006/metadata/contentType" xmlns:ma="http://schemas.microsoft.com/office/2006/metadata/properties/metaAttributes" ct:_="" ma:_="" ma:contentTypeName="Document" ma:contentTypeID="0x01010079F111ED35F8CC479449609E8A0923A6" ma:contentTypeVersion="12" ma:contentTypeDescription="Create a new document." ma:contentTypeScope="" ma:versionID="a410dd7f93c95333ffa1b60ed6adedd1">
   <xsd:schema xmlns:xsd="http://www.w3.org/2001/XMLSchema" xmlns:xs="http://www.w3.org/2001/XMLSchema" xmlns:p="http://schemas.microsoft.com/office/2006/metadata/properties" xmlns:ns2="71af3243-3dd4-4a8d-8c0d-dd76da1f02a5" xmlns:ns3="16c05727-aa75-4e4a-9b5f-8a80a1165891" targetNamespace="http://schemas.microsoft.com/office/2006/metadata/properties" ma:root="true" ma:fieldsID="a936d9baba76aa3866493feff160faab" ns2:_="" ns3:_="">
     <xsd:import namespace="71af3243-3dd4-4a8d-8c0d-dd76da1f02a5"/>
@@ -10093,6 +10046,15 @@
 </ct:contentTypeSchema>
 </file>
 
+<file path=customXml/item2.xml><?xml version="1.0" encoding="utf-8"?>
+<p:properties xmlns:p="http://schemas.microsoft.com/office/2006/metadata/properties" xmlns:xsi="http://www.w3.org/2001/XMLSchema-instance" xmlns:pc="http://schemas.microsoft.com/office/infopath/2007/PartnerControls">
+  <documentManagement>
+    <Status xmlns="71af3243-3dd4-4a8d-8c0d-dd76da1f02a5">Not started</Status>
+    <MediaServiceKeyPoints xmlns="71af3243-3dd4-4a8d-8c0d-dd76da1f02a5" xsi:nil="true"/>
+  </documentManagement>
+</p:properties>
+</file>
+
 <file path=customXml/item3.xml><?xml version="1.0" encoding="utf-8"?>
 <?mso-contentType ?>
 <FormTemplates xmlns="http://schemas.microsoft.com/sharepoint/v3/contenttype/forms">
@@ -10103,23 +10065,6 @@
 </file>
 
 <file path=customXml/itemProps1.xml><?xml version="1.0" encoding="utf-8"?>
-<ds:datastoreItem xmlns:ds="http://schemas.openxmlformats.org/officeDocument/2006/customXml" ds:itemID="{A03EEFF0-FB57-4CB4-8BFC-DF397689E2ED}">
-  <ds:schemaRefs>
-    <ds:schemaRef ds:uri="http://schemas.microsoft.com/office/2006/documentManagement/types"/>
-    <ds:schemaRef ds:uri="http://schemas.microsoft.com/office/infopath/2007/PartnerControls"/>
-    <ds:schemaRef ds:uri="http://purl.org/dc/elements/1.1/"/>
-    <ds:schemaRef ds:uri="http://schemas.microsoft.com/office/2006/metadata/properties"/>
-    <ds:schemaRef ds:uri="http://purl.org/dc/terms/"/>
-    <ds:schemaRef ds:uri="http://schemas.openxmlformats.org/package/2006/metadata/core-properties"/>
-    <ds:schemaRef ds:uri="16c05727-aa75-4e4a-9b5f-8a80a1165891"/>
-    <ds:schemaRef ds:uri="71af3243-3dd4-4a8d-8c0d-dd76da1f02a5"/>
-    <ds:schemaRef ds:uri="http://www.w3.org/XML/1998/namespace"/>
-    <ds:schemaRef ds:uri="http://purl.org/dc/dcmitype/"/>
-  </ds:schemaRefs>
-</ds:datastoreItem>
-</file>
-
-<file path=customXml/itemProps2.xml><?xml version="1.0" encoding="utf-8"?>
 <ds:datastoreItem xmlns:ds="http://schemas.openxmlformats.org/officeDocument/2006/customXml" ds:itemID="{93932EF5-314F-409E-8020-FEE5FA0795B9}">
   <ds:schemaRefs>
     <ds:schemaRef ds:uri="http://schemas.microsoft.com/office/2006/metadata/contentType"/>
@@ -10138,6 +10083,23 @@
 </ds:datastoreItem>
 </file>
 
+<file path=customXml/itemProps2.xml><?xml version="1.0" encoding="utf-8"?>
+<ds:datastoreItem xmlns:ds="http://schemas.openxmlformats.org/officeDocument/2006/customXml" ds:itemID="{A03EEFF0-FB57-4CB4-8BFC-DF397689E2ED}">
+  <ds:schemaRefs>
+    <ds:schemaRef ds:uri="http://schemas.microsoft.com/office/2006/documentManagement/types"/>
+    <ds:schemaRef ds:uri="http://schemas.microsoft.com/office/infopath/2007/PartnerControls"/>
+    <ds:schemaRef ds:uri="http://purl.org/dc/elements/1.1/"/>
+    <ds:schemaRef ds:uri="http://schemas.microsoft.com/office/2006/metadata/properties"/>
+    <ds:schemaRef ds:uri="http://purl.org/dc/terms/"/>
+    <ds:schemaRef ds:uri="http://schemas.openxmlformats.org/package/2006/metadata/core-properties"/>
+    <ds:schemaRef ds:uri="16c05727-aa75-4e4a-9b5f-8a80a1165891"/>
+    <ds:schemaRef ds:uri="71af3243-3dd4-4a8d-8c0d-dd76da1f02a5"/>
+    <ds:schemaRef ds:uri="http://www.w3.org/XML/1998/namespace"/>
+    <ds:schemaRef ds:uri="http://purl.org/dc/dcmitype/"/>
+  </ds:schemaRefs>
+</ds:datastoreItem>
+</file>
+
 <file path=customXml/itemProps3.xml><?xml version="1.0" encoding="utf-8"?>
 <ds:datastoreItem xmlns:ds="http://schemas.openxmlformats.org/officeDocument/2006/customXml" ds:itemID="{AA3F7EDC-E5B4-4BBC-9D2A-CBE6D46C37AD}">
   <ds:schemaRefs>

</xml_diff>